<commit_message>
Algo Slide Deck v2
</commit_message>
<xml_diff>
--- a/Stock Trading Algo.pptx
+++ b/Stock Trading Algo.pptx
@@ -3206,7 +3206,7 @@
           <a:p>
             <a:fld id="{3A3D5627-0B12-48B1-B425-8E4660CD04F3}" type="datetimeFigureOut">
               <a:rPr lang="en-US" smtClean="0"/>
-              <a:t>3/5/2021</a:t>
+              <a:t>3/6/2021</a:t>
             </a:fld>
             <a:endParaRPr lang="en-US"/>
           </a:p>
@@ -3742,7 +3742,7 @@
           <a:p>
             <a:fld id="{88D38747-4367-4BD2-8D51-C97E202738E2}" type="datetime1">
               <a:rPr lang="en-US" smtClean="0"/>
-              <a:t>3/5/2021</a:t>
+              <a:t>3/6/2021</a:t>
             </a:fld>
             <a:endParaRPr lang="en-US" dirty="0"/>
           </a:p>
@@ -4047,7 +4047,7 @@
           <a:p>
             <a:fld id="{11F1B079-7EF0-44EE-B798-BCC497C9F3B2}" type="datetime1">
               <a:rPr lang="en-US" smtClean="0"/>
-              <a:t>3/5/2021</a:t>
+              <a:t>3/6/2021</a:t>
             </a:fld>
             <a:endParaRPr lang="en-US" dirty="0"/>
           </a:p>
@@ -4241,7 +4241,7 @@
           <a:p>
             <a:fld id="{28FF70A8-1D13-4657-95F0-A9EA54967B8D}" type="datetime1">
               <a:rPr lang="en-US" smtClean="0"/>
-              <a:t>3/5/2021</a:t>
+              <a:t>3/6/2021</a:t>
             </a:fld>
             <a:endParaRPr lang="en-US" dirty="0"/>
           </a:p>
@@ -4504,7 +4504,7 @@
           <a:p>
             <a:fld id="{21EB90AC-71BD-4C7F-8ACA-7B3F18292E63}" type="datetime1">
               <a:rPr lang="en-US" smtClean="0"/>
-              <a:t>3/5/2021</a:t>
+              <a:t>3/6/2021</a:t>
             </a:fld>
             <a:endParaRPr lang="en-US" dirty="0"/>
           </a:p>
@@ -4940,7 +4940,7 @@
           <a:p>
             <a:fld id="{4E6EFC2C-8905-46F0-B443-CE905B76BA01}" type="datetime1">
               <a:rPr lang="en-US" smtClean="0"/>
-              <a:t>3/5/2021</a:t>
+              <a:t>3/6/2021</a:t>
             </a:fld>
             <a:endParaRPr lang="en-US" dirty="0"/>
           </a:p>
@@ -5477,7 +5477,7 @@
           <a:p>
             <a:fld id="{D9079DC3-C9B5-499E-9140-0DC28B7074E2}" type="datetime1">
               <a:rPr lang="en-US" smtClean="0"/>
-              <a:t>3/5/2021</a:t>
+              <a:t>3/6/2021</a:t>
             </a:fld>
             <a:endParaRPr lang="en-US" dirty="0"/>
           </a:p>
@@ -6359,7 +6359,7 @@
           <a:p>
             <a:fld id="{30BB33EA-E472-4D22-9C03-A9C14AA21CED}" type="datetime1">
               <a:rPr lang="en-US" smtClean="0"/>
-              <a:t>3/5/2021</a:t>
+              <a:t>3/6/2021</a:t>
             </a:fld>
             <a:endParaRPr lang="en-US" dirty="0"/>
           </a:p>
@@ -6529,7 +6529,7 @@
           <a:p>
             <a:fld id="{73C55A3C-5767-4844-A0A3-83778C2E5409}" type="datetime1">
               <a:rPr lang="en-US" smtClean="0"/>
-              <a:t>3/5/2021</a:t>
+              <a:t>3/6/2021</a:t>
             </a:fld>
             <a:endParaRPr lang="en-US" dirty="0"/>
           </a:p>
@@ -6773,7 +6773,7 @@
           <a:p>
             <a:fld id="{CAE507A8-A5CF-4D38-AB86-7EDDA87A85D4}" type="datetime1">
               <a:rPr lang="en-US" smtClean="0"/>
-              <a:t>3/5/2021</a:t>
+              <a:t>3/6/2021</a:t>
             </a:fld>
             <a:endParaRPr lang="en-US" dirty="0"/>
           </a:p>
@@ -7015,7 +7015,7 @@
           <a:p>
             <a:fld id="{BDFCD27C-8599-43EF-BA1D-14DDC1946E06}" type="datetime1">
               <a:rPr lang="en-US" smtClean="0"/>
-              <a:t>3/5/2021</a:t>
+              <a:t>3/6/2021</a:t>
             </a:fld>
             <a:endParaRPr lang="en-US" dirty="0"/>
           </a:p>
@@ -7498,7 +7498,7 @@
           <a:p>
             <a:fld id="{49343D99-809A-49C0-96E5-4250D0B498EE}" type="datetime1">
               <a:rPr lang="en-US" smtClean="0"/>
-              <a:t>3/5/2021</a:t>
+              <a:t>3/6/2021</a:t>
             </a:fld>
             <a:endParaRPr lang="en-US" dirty="0"/>
           </a:p>
@@ -7616,7 +7616,7 @@
           <a:p>
             <a:fld id="{A143DE9B-B678-4EFB-BB7D-A4370204A0B0}" type="datetime1">
               <a:rPr lang="en-US" smtClean="0"/>
-              <a:t>3/5/2021</a:t>
+              <a:t>3/6/2021</a:t>
             </a:fld>
             <a:endParaRPr lang="en-US" dirty="0"/>
           </a:p>
@@ -7711,7 +7711,7 @@
           <a:p>
             <a:fld id="{E68812DA-F765-4142-A6A3-A8ED7235E082}" type="datetime1">
               <a:rPr lang="en-US" smtClean="0"/>
-              <a:t>3/5/2021</a:t>
+              <a:t>3/6/2021</a:t>
             </a:fld>
             <a:endParaRPr lang="en-US" dirty="0"/>
           </a:p>
@@ -7966,7 +7966,7 @@
           <a:p>
             <a:fld id="{3E0277FD-7DE6-41D4-930D-AC99F5AFE54E}" type="datetime1">
               <a:rPr lang="en-US" smtClean="0"/>
-              <a:t>3/5/2021</a:t>
+              <a:t>3/6/2021</a:t>
             </a:fld>
             <a:endParaRPr lang="en-US" dirty="0"/>
           </a:p>
@@ -8273,7 +8273,7 @@
           <a:p>
             <a:fld id="{9EA15526-7079-4B7B-987C-1B5FAE11A0FF}" type="datetime1">
               <a:rPr lang="en-US" smtClean="0"/>
-              <a:t>3/5/2021</a:t>
+              <a:t>3/6/2021</a:t>
             </a:fld>
             <a:endParaRPr lang="en-US" dirty="0"/>
           </a:p>
@@ -8508,7 +8508,7 @@
           <a:p>
             <a:fld id="{073ED0CC-082F-4160-86E5-0D6041F12778}" type="datetime1">
               <a:rPr lang="en-US" smtClean="0"/>
-              <a:t>3/5/2021</a:t>
+              <a:t>3/6/2021</a:t>
             </a:fld>
             <a:endParaRPr lang="en-US" dirty="0"/>
           </a:p>
@@ -9388,7 +9388,7 @@
           </a:effectLst>
           <a:extLst>
             <a:ext uri="{91240B29-F687-4f45-9708-019B960494DF}">
-              <a14:hiddenLine xmlns:a16="http://schemas.microsoft.com/office/drawing/2014/main" xmlns:p14="http://schemas.microsoft.com/office/powerpoint/2010/main" xmlns:a14="http://schemas.microsoft.com/office/drawing/2010/main" xmlns="" w="9525">
+              <a14:hiddenLine xmlns="" xmlns:a14="http://schemas.microsoft.com/office/drawing/2010/main" xmlns:p14="http://schemas.microsoft.com/office/powerpoint/2010/main" xmlns:a16="http://schemas.microsoft.com/office/drawing/2014/main" w="9525">
                 <a:solidFill>
                   <a:srgbClr val="000000"/>
                 </a:solidFill>
@@ -10329,7 +10329,7 @@
           <a:p>
             <a:r>
               <a:rPr lang="en-US" dirty="0"/>
-              <a:t>Our system evaluated _______ months of historical data consisting of daily close prices of ____ top stocks from each industry.</a:t>
+              <a:t>Our system evaluated 6mos of historical data consisting of daily close prices of a top stock from each industry.</a:t>
             </a:r>
           </a:p>
           <a:p>
@@ -11223,10 +11223,10 @@
       </p:sp>
       <p:pic>
         <p:nvPicPr>
-          <p:cNvPr id="4" name="Picture 3">
+          <p:cNvPr id="8" name="Picture 7">
             <a:extLst>
               <a:ext uri="{FF2B5EF4-FFF2-40B4-BE49-F238E27FC236}">
-                <a16:creationId xmlns:a16="http://schemas.microsoft.com/office/drawing/2014/main" id="{68E3EB8D-525C-4872-8939-A2E8F38F186E}"/>
+                <a16:creationId xmlns:a16="http://schemas.microsoft.com/office/drawing/2014/main" id="{E312184E-6E0D-4EE1-B0DF-489ECC57D53E}"/>
               </a:ext>
             </a:extLst>
           </p:cNvPr>
@@ -11243,8 +11243,38 @@
         </p:blipFill>
         <p:spPr>
           <a:xfrm>
-            <a:off x="5502152" y="1438360"/>
-            <a:ext cx="4913212" cy="3835314"/>
+            <a:off x="5092505" y="1383689"/>
+            <a:ext cx="5655212" cy="2949160"/>
+          </a:xfrm>
+          <a:prstGeom prst="rect">
+            <a:avLst/>
+          </a:prstGeom>
+        </p:spPr>
+      </p:pic>
+      <p:pic>
+        <p:nvPicPr>
+          <p:cNvPr id="10" name="Picture 9">
+            <a:extLst>
+              <a:ext uri="{FF2B5EF4-FFF2-40B4-BE49-F238E27FC236}">
+                <a16:creationId xmlns:a16="http://schemas.microsoft.com/office/drawing/2014/main" id="{4315DB42-7C7C-49CA-8BA1-33F1CFF2A7B2}"/>
+              </a:ext>
+            </a:extLst>
+          </p:cNvPr>
+          <p:cNvPicPr>
+            <a:picLocks noChangeAspect="1"/>
+          </p:cNvPicPr>
+          <p:nvPr/>
+        </p:nvPicPr>
+        <p:blipFill>
+          <a:blip r:embed="rId4"/>
+          <a:stretch>
+            <a:fillRect/>
+          </a:stretch>
+        </p:blipFill>
+        <p:spPr>
+          <a:xfrm>
+            <a:off x="5681435" y="4332849"/>
+            <a:ext cx="4529797" cy="779678"/>
           </a:xfrm>
           <a:prstGeom prst="rect">
             <a:avLst/>
@@ -12155,6 +12185,15 @@
 </file>
 
 <file path=customXml/item2.xml><?xml version="1.0" encoding="utf-8"?>
+<p:properties xmlns:p="http://schemas.microsoft.com/office/2006/metadata/properties" xmlns:xsi="http://www.w3.org/2001/XMLSchema-instance" xmlns:pc="http://schemas.microsoft.com/office/infopath/2007/PartnerControls">
+  <documentManagement>
+    <Status xmlns="71af3243-3dd4-4a8d-8c0d-dd76da1f02a5">Not started</Status>
+    <MediaServiceKeyPoints xmlns="71af3243-3dd4-4a8d-8c0d-dd76da1f02a5" xsi:nil="true"/>
+  </documentManagement>
+</p:properties>
+</file>
+
+<file path=customXml/item3.xml><?xml version="1.0" encoding="utf-8"?>
 <ct:contentTypeSchema xmlns:ct="http://schemas.microsoft.com/office/2006/metadata/contentType" xmlns:ma="http://schemas.microsoft.com/office/2006/metadata/properties/metaAttributes" ct:_="" ma:_="" ma:contentTypeName="Document" ma:contentTypeID="0x01010079F111ED35F8CC479449609E8A0923A6" ma:contentTypeVersion="12" ma:contentTypeDescription="Create a new document." ma:contentTypeScope="" ma:versionID="a410dd7f93c95333ffa1b60ed6adedd1">
   <xsd:schema xmlns:xsd="http://www.w3.org/2001/XMLSchema" xmlns:xs="http://www.w3.org/2001/XMLSchema" xmlns:p="http://schemas.microsoft.com/office/2006/metadata/properties" xmlns:ns2="71af3243-3dd4-4a8d-8c0d-dd76da1f02a5" xmlns:ns3="16c05727-aa75-4e4a-9b5f-8a80a1165891" targetNamespace="http://schemas.microsoft.com/office/2006/metadata/properties" ma:root="true" ma:fieldsID="a936d9baba76aa3866493feff160faab" ns2:_="" ns3:_="">
     <xsd:import namespace="71af3243-3dd4-4a8d-8c0d-dd76da1f02a5"/>
@@ -12375,15 +12414,6 @@
 </ct:contentTypeSchema>
 </file>
 
-<file path=customXml/item3.xml><?xml version="1.0" encoding="utf-8"?>
-<p:properties xmlns:p="http://schemas.microsoft.com/office/2006/metadata/properties" xmlns:xsi="http://www.w3.org/2001/XMLSchema-instance" xmlns:pc="http://schemas.microsoft.com/office/infopath/2007/PartnerControls">
-  <documentManagement>
-    <Status xmlns="71af3243-3dd4-4a8d-8c0d-dd76da1f02a5">Not started</Status>
-    <MediaServiceKeyPoints xmlns="71af3243-3dd4-4a8d-8c0d-dd76da1f02a5" xsi:nil="true"/>
-  </documentManagement>
-</p:properties>
-</file>
-
 <file path=customXml/itemProps1.xml><?xml version="1.0" encoding="utf-8"?>
 <ds:datastoreItem xmlns:ds="http://schemas.openxmlformats.org/officeDocument/2006/customXml" ds:itemID="{30CB38EC-895A-4F8F-8F75-E263501ABB5A}">
   <ds:schemaRefs>
@@ -12393,6 +12423,16 @@
 </file>
 
 <file path=customXml/itemProps2.xml><?xml version="1.0" encoding="utf-8"?>
+<ds:datastoreItem xmlns:ds="http://schemas.openxmlformats.org/officeDocument/2006/customXml" ds:itemID="{F7E70FC5-1855-47AB-8CE1-CB3C873A8988}">
+  <ds:schemaRefs>
+    <ds:schemaRef ds:uri="http://schemas.microsoft.com/office/2006/metadata/properties"/>
+    <ds:schemaRef ds:uri="http://schemas.microsoft.com/office/infopath/2007/PartnerControls"/>
+    <ds:schemaRef ds:uri="71af3243-3dd4-4a8d-8c0d-dd76da1f02a5"/>
+  </ds:schemaRefs>
+</ds:datastoreItem>
+</file>
+
+<file path=customXml/itemProps3.xml><?xml version="1.0" encoding="utf-8"?>
 <ds:datastoreItem xmlns:ds="http://schemas.openxmlformats.org/officeDocument/2006/customXml" ds:itemID="{5560E646-30AD-4BA0-97EA-A7A07DF5499A}">
   <ds:schemaRefs>
     <ds:schemaRef ds:uri="http://schemas.microsoft.com/office/2006/metadata/contentType"/>
@@ -12409,14 +12449,4 @@
     <ds:schemaRef ds:uri="http://schemas.microsoft.com/internal/obd"/>
   </ds:schemaRefs>
 </ds:datastoreItem>
-</file>
-
-<file path=customXml/itemProps3.xml><?xml version="1.0" encoding="utf-8"?>
-<ds:datastoreItem xmlns:ds="http://schemas.openxmlformats.org/officeDocument/2006/customXml" ds:itemID="{F7E70FC5-1855-47AB-8CE1-CB3C873A8988}">
-  <ds:schemaRefs>
-    <ds:schemaRef ds:uri="http://schemas.microsoft.com/office/2006/metadata/properties"/>
-    <ds:schemaRef ds:uri="http://schemas.microsoft.com/office/infopath/2007/PartnerControls"/>
-    <ds:schemaRef ds:uri="71af3243-3dd4-4a8d-8c0d-dd76da1f02a5"/>
-  </ds:schemaRefs>
-</ds:datastoreItem>
 </file>
</xml_diff>

<commit_message>
Algo Slide Deck v3
</commit_message>
<xml_diff>
--- a/Stock Trading Algo.pptx
+++ b/Stock Trading Algo.pptx
@@ -5,22 +5,20 @@
     <p:sldMasterId id="2147483660" r:id="rId4"/>
   </p:sldMasterIdLst>
   <p:notesMasterIdLst>
-    <p:notesMasterId r:id="rId18"/>
+    <p:notesMasterId r:id="rId16"/>
   </p:notesMasterIdLst>
   <p:sldIdLst>
     <p:sldId id="280" r:id="rId5"/>
     <p:sldId id="295" r:id="rId6"/>
-    <p:sldId id="281" r:id="rId7"/>
-    <p:sldId id="289" r:id="rId8"/>
-    <p:sldId id="282" r:id="rId9"/>
-    <p:sldId id="288" r:id="rId10"/>
-    <p:sldId id="284" r:id="rId11"/>
+    <p:sldId id="288" r:id="rId7"/>
+    <p:sldId id="281" r:id="rId8"/>
+    <p:sldId id="285" r:id="rId9"/>
+    <p:sldId id="284" r:id="rId10"/>
+    <p:sldId id="296" r:id="rId11"/>
     <p:sldId id="292" r:id="rId12"/>
-    <p:sldId id="293" r:id="rId13"/>
-    <p:sldId id="290" r:id="rId14"/>
-    <p:sldId id="285" r:id="rId15"/>
-    <p:sldId id="286" r:id="rId16"/>
-    <p:sldId id="287" r:id="rId17"/>
+    <p:sldId id="290" r:id="rId13"/>
+    <p:sldId id="282" r:id="rId14"/>
+    <p:sldId id="287" r:id="rId15"/>
   </p:sldIdLst>
   <p:sldSz cx="12192000" cy="6858000"/>
   <p:notesSz cx="6858000" cy="9144000"/>
@@ -946,7 +944,7 @@
           </a:pPr>
           <a:r>
             <a:rPr lang="en-US" dirty="0"/>
-            <a:t>Neural Network model utilizing stocks and four (4) features: Bollinger Bands, MACD, RSI and EMA benchmarked against the S&amp;P500.</a:t>
+            <a:t>Neural Network model utilizing  four (5) stock indicators as features: Bollinger Bands, MACD, RSI, RSI Signal and EMA benchmarked against the S&amp;P500.</a:t>
           </a:r>
         </a:p>
       </dgm:t>
@@ -1029,7 +1027,7 @@
           </a:pPr>
           <a:r>
             <a:rPr lang="en-US" dirty="0"/>
-            <a:t>Utilized Positive Returns as the Target to determine the success of our model. Long positions represented as “1”, Short positions represented as “-1” and “0” represented as neutral</a:t>
+            <a:t>Our model utilized Positive Returns as the Target to determine the success of making accurate predictions. </a:t>
           </a:r>
         </a:p>
       </dgm:t>
@@ -1112,7 +1110,7 @@
           </a:pPr>
           <a:r>
             <a:rPr lang="en-US" dirty="0"/>
-            <a:t>While the model accuracy score is low, results from  cumulative returns were favorable</a:t>
+            <a:t>While the model accuracy score was low, cumulative returns primarily matched the overall market returns</a:t>
           </a:r>
         </a:p>
       </dgm:t>
@@ -1382,8 +1380,8 @@
       </dsp:nvSpPr>
       <dsp:spPr>
         <a:xfrm>
-          <a:off x="4636378" y="188957"/>
-          <a:ext cx="1079788" cy="1079788"/>
+          <a:off x="4635850" y="177575"/>
+          <a:ext cx="1080843" cy="1080843"/>
         </a:xfrm>
         <a:prstGeom prst="rect">
           <a:avLst/>
@@ -1431,8 +1429,8 @@
       </dsp:nvSpPr>
       <dsp:spPr>
         <a:xfrm>
-          <a:off x="9279" y="1382760"/>
-          <a:ext cx="3085109" cy="462766"/>
+          <a:off x="4228" y="1373383"/>
+          <a:ext cx="3088125" cy="463218"/>
         </a:xfrm>
         <a:prstGeom prst="rect">
           <a:avLst/>
@@ -1481,8 +1479,8 @@
         </a:p>
       </dsp:txBody>
       <dsp:txXfrm>
-        <a:off x="9279" y="1382760"/>
-        <a:ext cx="3085109" cy="462766"/>
+        <a:off x="4228" y="1373383"/>
+        <a:ext cx="3088125" cy="463218"/>
       </dsp:txXfrm>
     </dsp:sp>
     <dsp:sp modelId="{DD091D0A-5A25-4241-91F3-18D32B0BDD4F}">
@@ -1492,8 +1490,8 @@
       </dsp:nvSpPr>
       <dsp:spPr>
         <a:xfrm>
-          <a:off x="9279" y="1941732"/>
-          <a:ext cx="3085109" cy="1584060"/>
+          <a:off x="4228" y="1933292"/>
+          <a:ext cx="3088125" cy="1603882"/>
         </a:xfrm>
         <a:prstGeom prst="rect">
           <a:avLst/>
@@ -1536,13 +1534,13 @@
           </a:pPr>
           <a:r>
             <a:rPr lang="en-US" sz="1700" kern="1200" dirty="0"/>
-            <a:t>Neural Network model utilizing stocks and four (4) features: Bollinger Bands, MACD, RSI and EMA benchmarked against the S&amp;P500.</a:t>
+            <a:t>Neural Network model utilizing  four (5) stock indicators as features: Bollinger Bands, MACD, RSI, RSI Signal and EMA benchmarked against the S&amp;P500.</a:t>
           </a:r>
         </a:p>
       </dsp:txBody>
       <dsp:txXfrm>
-        <a:off x="9279" y="1941732"/>
-        <a:ext cx="3085109" cy="1584060"/>
+        <a:off x="4228" y="1933292"/>
+        <a:ext cx="3088125" cy="1603882"/>
       </dsp:txXfrm>
     </dsp:sp>
     <dsp:sp modelId="{210823F6-AC1A-46E3-9D99-A319DF497539}">
@@ -1552,8 +1550,8 @@
       </dsp:nvSpPr>
       <dsp:spPr>
         <a:xfrm>
-          <a:off x="8364642" y="214548"/>
-          <a:ext cx="1079788" cy="1079788"/>
+          <a:off x="8367758" y="203191"/>
+          <a:ext cx="1080843" cy="1080843"/>
         </a:xfrm>
         <a:prstGeom prst="rect">
           <a:avLst/>
@@ -1601,8 +1599,8 @@
       </dsp:nvSpPr>
       <dsp:spPr>
         <a:xfrm>
-          <a:off x="3639033" y="1320564"/>
-          <a:ext cx="3085109" cy="462766"/>
+          <a:off x="3637530" y="1311127"/>
+          <a:ext cx="3088125" cy="463218"/>
         </a:xfrm>
         <a:prstGeom prst="rect">
           <a:avLst/>
@@ -1651,8 +1649,8 @@
         </a:p>
       </dsp:txBody>
       <dsp:txXfrm>
-        <a:off x="3639033" y="1320564"/>
-        <a:ext cx="3085109" cy="462766"/>
+        <a:off x="3637530" y="1311127"/>
+        <a:ext cx="3088125" cy="463218"/>
       </dsp:txXfrm>
     </dsp:sp>
     <dsp:sp modelId="{7CD40649-A74C-4AD8-B9D0-2573A1955C91}">
@@ -1662,8 +1660,8 @@
       </dsp:nvSpPr>
       <dsp:spPr>
         <a:xfrm>
-          <a:off x="3634282" y="1899295"/>
-          <a:ext cx="3085109" cy="1584060"/>
+          <a:off x="3632774" y="1890324"/>
+          <a:ext cx="3088125" cy="1603882"/>
         </a:xfrm>
         <a:prstGeom prst="rect">
           <a:avLst/>
@@ -1706,13 +1704,13 @@
           </a:pPr>
           <a:r>
             <a:rPr lang="en-US" sz="1700" kern="1200" dirty="0"/>
-            <a:t>Utilized Positive Returns as the Target to determine the success of our model. Long positions represented as “1”, Short positions represented as “-1” and “0” represented as neutral</a:t>
+            <a:t>Our model utilized Positive Returns as the Target to determine the success of making accurate predictions. </a:t>
           </a:r>
         </a:p>
       </dsp:txBody>
       <dsp:txXfrm>
-        <a:off x="3634282" y="1899295"/>
-        <a:ext cx="3085109" cy="1584060"/>
+        <a:off x="3632774" y="1890324"/>
+        <a:ext cx="3088125" cy="1603882"/>
       </dsp:txXfrm>
     </dsp:sp>
     <dsp:sp modelId="{B0A3ABD2-C471-4A21-8AEF-3843C86919E1}">
@@ -1722,8 +1720,8 @@
       </dsp:nvSpPr>
       <dsp:spPr>
         <a:xfrm>
-          <a:off x="1071755" y="207194"/>
-          <a:ext cx="1079788" cy="1079788"/>
+          <a:off x="1067742" y="195830"/>
+          <a:ext cx="1080843" cy="1080843"/>
         </a:xfrm>
         <a:prstGeom prst="rect">
           <a:avLst/>
@@ -1771,8 +1769,8 @@
       </dsp:nvSpPr>
       <dsp:spPr>
         <a:xfrm>
-          <a:off x="7259286" y="1412229"/>
-          <a:ext cx="3085109" cy="462766"/>
+          <a:off x="7261321" y="1402881"/>
+          <a:ext cx="3088125" cy="463218"/>
         </a:xfrm>
         <a:prstGeom prst="rect">
           <a:avLst/>
@@ -1821,8 +1819,8 @@
         </a:p>
       </dsp:txBody>
       <dsp:txXfrm>
-        <a:off x="7259286" y="1412229"/>
-        <a:ext cx="3085109" cy="462766"/>
+        <a:off x="7261321" y="1402881"/>
+        <a:ext cx="3088125" cy="463218"/>
       </dsp:txXfrm>
     </dsp:sp>
     <dsp:sp modelId="{6418EBED-F111-425B-8EE2-06B8B2297A68}">
@@ -1832,8 +1830,8 @@
       </dsp:nvSpPr>
       <dsp:spPr>
         <a:xfrm>
-          <a:off x="7259286" y="1941732"/>
-          <a:ext cx="3085109" cy="1584060"/>
+          <a:off x="7261321" y="1933292"/>
+          <a:ext cx="3088125" cy="1603882"/>
         </a:xfrm>
         <a:prstGeom prst="rect">
           <a:avLst/>
@@ -1876,13 +1874,13 @@
           </a:pPr>
           <a:r>
             <a:rPr lang="en-US" sz="1700" kern="1200" dirty="0"/>
-            <a:t>While the model accuracy score is low, results from  cumulative returns were favorable</a:t>
+            <a:t>While the model accuracy score was low, cumulative returns primarily matched the overall market returns</a:t>
           </a:r>
         </a:p>
       </dsp:txBody>
       <dsp:txXfrm>
-        <a:off x="7259286" y="1941732"/>
-        <a:ext cx="3085109" cy="1584060"/>
+        <a:off x="7261321" y="1933292"/>
+        <a:ext cx="3088125" cy="1603882"/>
       </dsp:txXfrm>
     </dsp:sp>
   </dsp:spTree>
@@ -9539,7 +9537,7 @@
                   </a:schemeClr>
                 </a:solidFill>
               </a:rPr>
-              <a:t>A Winning Strategy </a:t>
+              <a:t>Utilizing Stock Signals to Predict Future Price</a:t>
             </a:r>
             <a:br>
               <a:rPr lang="en-US" sz="4000" dirty="0">
@@ -9700,25 +9698,6 @@
 <file path=ppt/slides/slide10.xml><?xml version="1.0" encoding="utf-8"?>
 <p:sld xmlns:a="http://schemas.openxmlformats.org/drawingml/2006/main" xmlns:r="http://schemas.openxmlformats.org/officeDocument/2006/relationships" xmlns:p="http://schemas.openxmlformats.org/presentationml/2006/main">
   <p:cSld>
-    <p:bg>
-      <p:bgPr>
-        <a:blipFill rotWithShape="1">
-          <a:blip r:embed="rId2">
-            <a:duotone>
-              <a:schemeClr val="bg1">
-                <a:shade val="80000"/>
-                <a:lumMod val="80000"/>
-              </a:schemeClr>
-              <a:schemeClr val="bg1">
-                <a:tint val="98000"/>
-              </a:schemeClr>
-            </a:duotone>
-          </a:blip>
-          <a:stretch/>
-        </a:blipFill>
-        <a:effectLst/>
-      </p:bgPr>
-    </p:bg>
     <p:spTree>
       <p:nvGrpSpPr>
         <p:cNvPr id="1" name=""/>
@@ -9735,68 +9714,29 @@
       </p:grpSpPr>
       <p:sp>
         <p:nvSpPr>
-          <p:cNvPr id="22" name="Rectangle 17">
+          <p:cNvPr id="2" name="Title 1">
             <a:extLst>
               <a:ext uri="{FF2B5EF4-FFF2-40B4-BE49-F238E27FC236}">
-                <a16:creationId xmlns:a16="http://schemas.microsoft.com/office/drawing/2014/main" id="{1149F43D-E43A-49B5-B781-48DF10A581BD}"/>
-              </a:ext>
-              <a:ext uri="{C183D7F6-B498-43B3-948B-1728B52AA6E4}">
-                <adec:decorative xmlns:adec="http://schemas.microsoft.com/office/drawing/2017/decorative" val="1"/>
+                <a16:creationId xmlns:a16="http://schemas.microsoft.com/office/drawing/2014/main" id="{E1F4E428-E98C-4185-A0F1-D557D688E60C}"/>
               </a:ext>
             </a:extLst>
           </p:cNvPr>
           <p:cNvSpPr>
-            <a:spLocks noGrp="1" noRot="1" noChangeAspect="1" noMove="1" noResize="1" noEditPoints="1" noAdjustHandles="1" noChangeArrowheads="1" noChangeShapeType="1" noTextEdit="1"/>
-          </p:cNvSpPr>
-          <p:nvPr>
-            <p:extLst>
-              <p:ext uri="{386F3935-93C4-4BCD-93E2-E3B085C9AB24}">
-                <p16:designElem xmlns:p16="http://schemas.microsoft.com/office/powerpoint/2015/main" val="1"/>
-              </p:ext>
-            </p:extLst>
-          </p:nvPr>
-        </p:nvSpPr>
-        <p:spPr>
-          <a:xfrm>
-            <a:off x="985720" y="968938"/>
-            <a:ext cx="10278846" cy="4932523"/>
-          </a:xfrm>
-          <a:prstGeom prst="rect">
-            <a:avLst/>
-          </a:prstGeom>
-          <a:solidFill>
-            <a:schemeClr val="tx1"/>
-          </a:solidFill>
-          <a:ln w="190500">
-            <a:solidFill>
-              <a:schemeClr val="tx1">
-                <a:alpha val="7000"/>
-              </a:schemeClr>
-            </a:solidFill>
-          </a:ln>
-        </p:spPr>
-        <p:style>
-          <a:lnRef idx="2">
-            <a:schemeClr val="accent1">
-              <a:shade val="50000"/>
-            </a:schemeClr>
-          </a:lnRef>
-          <a:fillRef idx="1">
-            <a:schemeClr val="accent1"/>
-          </a:fillRef>
-          <a:effectRef idx="0">
-            <a:schemeClr val="accent1"/>
-          </a:effectRef>
-          <a:fontRef idx="minor">
-            <a:schemeClr val="lt1"/>
-          </a:fontRef>
-        </p:style>
-        <p:txBody>
-          <a:bodyPr rtlCol="0" anchor="ctr"/>
+            <a:spLocks noGrp="1"/>
+          </p:cNvSpPr>
+          <p:nvPr>
+            <p:ph type="title"/>
+          </p:nvPr>
+        </p:nvSpPr>
+        <p:spPr/>
+        <p:txBody>
+          <a:bodyPr/>
           <a:lstStyle/>
           <a:p>
-            <a:pPr algn="ctr"/>
-            <a:endParaRPr lang="en-US"/>
+            <a:r>
+              <a:rPr lang="en-US" dirty="0"/>
+              <a:t>Core Questions</a:t>
+            </a:r>
           </a:p>
         </p:txBody>
       </p:sp>
@@ -9805,7 +9745,7 @@
           <p:cNvPr id="3" name="Content Placeholder 2">
             <a:extLst>
               <a:ext uri="{FF2B5EF4-FFF2-40B4-BE49-F238E27FC236}">
-                <a16:creationId xmlns:a16="http://schemas.microsoft.com/office/drawing/2014/main" id="{E2ED60D4-C132-4EF3-BEF9-D263284BA122}"/>
+                <a16:creationId xmlns:a16="http://schemas.microsoft.com/office/drawing/2014/main" id="{56E7A42E-888A-44C3-8027-F5874647FF0C}"/>
               </a:ext>
             </a:extLst>
           </p:cNvPr>
@@ -9818,17 +9758,28 @@
         </p:nvSpPr>
         <p:spPr/>
         <p:txBody>
-          <a:bodyPr/>
+          <a:bodyPr>
+            <a:normAutofit/>
+          </a:bodyPr>
           <a:lstStyle/>
           <a:p>
-            <a:endParaRPr lang="en-US"/>
+            <a:r>
+              <a:rPr lang="en-US" dirty="0"/>
+              <a:t>Can we iteratively improve the model accuracy by analyzing additional Time Series data and/or utilizing NLP to include additional features based on fundamental analysis?</a:t>
+            </a:r>
+          </a:p>
+          <a:p>
+            <a:r>
+              <a:rPr lang="en-US" dirty="0"/>
+              <a:t>Does the marketplace have additional signals that could have been utilize to enhance results (i.e., twitter, satellite feeds, etc.)</a:t>
+            </a:r>
           </a:p>
         </p:txBody>
       </p:sp>
     </p:spTree>
     <p:extLst>
       <p:ext uri="{BB962C8B-B14F-4D97-AF65-F5344CB8AC3E}">
-        <p14:creationId xmlns:p14="http://schemas.microsoft.com/office/powerpoint/2010/main" val="87073827"/>
+        <p14:creationId xmlns:p14="http://schemas.microsoft.com/office/powerpoint/2010/main" val="4202990932"/>
       </p:ext>
     </p:extLst>
   </p:cSld>
@@ -9839,203 +9790,6 @@
 </file>
 
 <file path=ppt/slides/slide11.xml><?xml version="1.0" encoding="utf-8"?>
-<p:sld xmlns:a="http://schemas.openxmlformats.org/drawingml/2006/main" xmlns:r="http://schemas.openxmlformats.org/officeDocument/2006/relationships" xmlns:p="http://schemas.openxmlformats.org/presentationml/2006/main">
-  <p:cSld>
-    <p:spTree>
-      <p:nvGrpSpPr>
-        <p:cNvPr id="1" name=""/>
-        <p:cNvGrpSpPr/>
-        <p:nvPr/>
-      </p:nvGrpSpPr>
-      <p:grpSpPr>
-        <a:xfrm>
-          <a:off x="0" y="0"/>
-          <a:ext cx="0" cy="0"/>
-          <a:chOff x="0" y="0"/>
-          <a:chExt cx="0" cy="0"/>
-        </a:xfrm>
-      </p:grpSpPr>
-      <p:sp>
-        <p:nvSpPr>
-          <p:cNvPr id="2" name="Title 1">
-            <a:extLst>
-              <a:ext uri="{FF2B5EF4-FFF2-40B4-BE49-F238E27FC236}">
-                <a16:creationId xmlns:a16="http://schemas.microsoft.com/office/drawing/2014/main" id="{E1F4E428-E98C-4185-A0F1-D557D688E60C}"/>
-              </a:ext>
-            </a:extLst>
-          </p:cNvPr>
-          <p:cNvSpPr>
-            <a:spLocks noGrp="1"/>
-          </p:cNvSpPr>
-          <p:nvPr>
-            <p:ph type="title"/>
-          </p:nvPr>
-        </p:nvSpPr>
-        <p:spPr/>
-        <p:txBody>
-          <a:bodyPr/>
-          <a:lstStyle/>
-          <a:p>
-            <a:r>
-              <a:rPr lang="en-US" dirty="0"/>
-              <a:t>Observations</a:t>
-            </a:r>
-          </a:p>
-        </p:txBody>
-      </p:sp>
-      <p:sp>
-        <p:nvSpPr>
-          <p:cNvPr id="3" name="Content Placeholder 2">
-            <a:extLst>
-              <a:ext uri="{FF2B5EF4-FFF2-40B4-BE49-F238E27FC236}">
-                <a16:creationId xmlns:a16="http://schemas.microsoft.com/office/drawing/2014/main" id="{56E7A42E-888A-44C3-8027-F5874647FF0C}"/>
-              </a:ext>
-            </a:extLst>
-          </p:cNvPr>
-          <p:cNvSpPr>
-            <a:spLocks noGrp="1"/>
-          </p:cNvSpPr>
-          <p:nvPr>
-            <p:ph idx="1"/>
-          </p:nvPr>
-        </p:nvSpPr>
-        <p:spPr/>
-        <p:txBody>
-          <a:bodyPr>
-            <a:normAutofit lnSpcReduction="10000"/>
-          </a:bodyPr>
-          <a:lstStyle/>
-          <a:p>
-            <a:r>
-              <a:rPr lang="en-US" dirty="0"/>
-              <a:t>We discovered that although the accuracy score was slightly above 50%, the overall performance over the targeted time period out-performed our SP&amp;500 benchmark by more than 5% in most cases and as much as 20% in other cases.</a:t>
-            </a:r>
-          </a:p>
-          <a:p>
-            <a:r>
-              <a:rPr lang="en-US" dirty="0"/>
-              <a:t>Absent analysis of individual features made it difficult to determine which had the highest impact on returns thus a classification report would need to be produced in order to perform this level of analysis.</a:t>
-            </a:r>
-          </a:p>
-          <a:p>
-            <a:r>
-              <a:rPr lang="en-US" dirty="0"/>
-              <a:t>While the model performs well over a 6mo period, testing over longer periods produced…….</a:t>
-            </a:r>
-          </a:p>
-          <a:p>
-            <a:endParaRPr lang="en-US" dirty="0"/>
-          </a:p>
-        </p:txBody>
-      </p:sp>
-    </p:spTree>
-    <p:extLst>
-      <p:ext uri="{BB962C8B-B14F-4D97-AF65-F5344CB8AC3E}">
-        <p14:creationId xmlns:p14="http://schemas.microsoft.com/office/powerpoint/2010/main" val="2221805847"/>
-      </p:ext>
-    </p:extLst>
-  </p:cSld>
-  <p:clrMapOvr>
-    <a:masterClrMapping/>
-  </p:clrMapOvr>
-</p:sld>
-</file>
-
-<file path=ppt/slides/slide12.xml><?xml version="1.0" encoding="utf-8"?>
-<p:sld xmlns:a="http://schemas.openxmlformats.org/drawingml/2006/main" xmlns:r="http://schemas.openxmlformats.org/officeDocument/2006/relationships" xmlns:p="http://schemas.openxmlformats.org/presentationml/2006/main">
-  <p:cSld>
-    <p:spTree>
-      <p:nvGrpSpPr>
-        <p:cNvPr id="1" name=""/>
-        <p:cNvGrpSpPr/>
-        <p:nvPr/>
-      </p:nvGrpSpPr>
-      <p:grpSpPr>
-        <a:xfrm>
-          <a:off x="0" y="0"/>
-          <a:ext cx="0" cy="0"/>
-          <a:chOff x="0" y="0"/>
-          <a:chExt cx="0" cy="0"/>
-        </a:xfrm>
-      </p:grpSpPr>
-      <p:sp>
-        <p:nvSpPr>
-          <p:cNvPr id="2" name="Title 1">
-            <a:extLst>
-              <a:ext uri="{FF2B5EF4-FFF2-40B4-BE49-F238E27FC236}">
-                <a16:creationId xmlns:a16="http://schemas.microsoft.com/office/drawing/2014/main" id="{E1F4E428-E98C-4185-A0F1-D557D688E60C}"/>
-              </a:ext>
-            </a:extLst>
-          </p:cNvPr>
-          <p:cNvSpPr>
-            <a:spLocks noGrp="1"/>
-          </p:cNvSpPr>
-          <p:nvPr>
-            <p:ph type="title"/>
-          </p:nvPr>
-        </p:nvSpPr>
-        <p:spPr/>
-        <p:txBody>
-          <a:bodyPr/>
-          <a:lstStyle/>
-          <a:p>
-            <a:r>
-              <a:rPr lang="en-US" dirty="0"/>
-              <a:t>Postmortem</a:t>
-            </a:r>
-          </a:p>
-        </p:txBody>
-      </p:sp>
-      <p:sp>
-        <p:nvSpPr>
-          <p:cNvPr id="3" name="Content Placeholder 2">
-            <a:extLst>
-              <a:ext uri="{FF2B5EF4-FFF2-40B4-BE49-F238E27FC236}">
-                <a16:creationId xmlns:a16="http://schemas.microsoft.com/office/drawing/2014/main" id="{56E7A42E-888A-44C3-8027-F5874647FF0C}"/>
-              </a:ext>
-            </a:extLst>
-          </p:cNvPr>
-          <p:cNvSpPr>
-            <a:spLocks noGrp="1"/>
-          </p:cNvSpPr>
-          <p:nvPr>
-            <p:ph idx="1"/>
-          </p:nvPr>
-        </p:nvSpPr>
-        <p:spPr/>
-        <p:txBody>
-          <a:bodyPr>
-            <a:normAutofit/>
-          </a:bodyPr>
-          <a:lstStyle/>
-          <a:p>
-            <a:r>
-              <a:rPr lang="en-US" dirty="0"/>
-              <a:t>TBD.</a:t>
-            </a:r>
-          </a:p>
-          <a:p>
-            <a:pPr marL="36900" indent="0">
-              <a:buNone/>
-            </a:pPr>
-            <a:endParaRPr lang="en-US" dirty="0"/>
-          </a:p>
-        </p:txBody>
-      </p:sp>
-    </p:spTree>
-    <p:extLst>
-      <p:ext uri="{BB962C8B-B14F-4D97-AF65-F5344CB8AC3E}">
-        <p14:creationId xmlns:p14="http://schemas.microsoft.com/office/powerpoint/2010/main" val="3350243179"/>
-      </p:ext>
-    </p:extLst>
-  </p:cSld>
-  <p:clrMapOvr>
-    <a:masterClrMapping/>
-  </p:clrMapOvr>
-</p:sld>
-</file>
-
-<file path=ppt/slides/slide13.xml><?xml version="1.0" encoding="utf-8"?>
 <p:sld xmlns:a="http://schemas.openxmlformats.org/drawingml/2006/main" xmlns:r="http://schemas.openxmlformats.org/officeDocument/2006/relationships" xmlns:p="http://schemas.openxmlformats.org/presentationml/2006/main">
   <p:cSld>
     <p:bg>
@@ -10293,7 +10047,7 @@
           <a:p>
             <a:r>
               <a:rPr lang="en-US" dirty="0"/>
-              <a:t>Stock Trading Algo Overview</a:t>
+              <a:t>Stock Trading Model Overview</a:t>
             </a:r>
           </a:p>
         </p:txBody>
@@ -10329,13 +10083,13 @@
           <a:p>
             <a:r>
               <a:rPr lang="en-US" dirty="0"/>
-              <a:t>Our system evaluated 6mos of historical data consisting of daily close prices of a top stock from each industry.</a:t>
+              <a:t>Our system evaluated 1yr of historical data consisting of daily close prices of the S&amp;P500 index as compared to our Neural Network model.</a:t>
             </a:r>
           </a:p>
           <a:p>
             <a:r>
               <a:rPr lang="en-US" dirty="0"/>
-              <a:t>Allocating an initial investment of $10,000 over a 6-month holding period, our model endeavored to predict next days price and produce positive returns?</a:t>
+              <a:t>Allocating an initial investment of $10,000 over a 6-month holding period, our model endeavored to predict next days price and produce positive returns.</a:t>
             </a:r>
           </a:p>
           <a:p>
@@ -10359,25 +10113,6 @@
 <file path=ppt/slides/slide3.xml><?xml version="1.0" encoding="utf-8"?>
 <p:sld xmlns:a="http://schemas.openxmlformats.org/drawingml/2006/main" xmlns:r="http://schemas.openxmlformats.org/officeDocument/2006/relationships" xmlns:p="http://schemas.openxmlformats.org/presentationml/2006/main">
   <p:cSld>
-    <p:bg>
-      <p:bgPr>
-        <a:blipFill rotWithShape="1">
-          <a:blip r:embed="rId2">
-            <a:duotone>
-              <a:schemeClr val="bg1">
-                <a:shade val="80000"/>
-                <a:lumMod val="80000"/>
-              </a:schemeClr>
-              <a:schemeClr val="bg1">
-                <a:tint val="98000"/>
-              </a:schemeClr>
-            </a:duotone>
-          </a:blip>
-          <a:stretch/>
-        </a:blipFill>
-        <a:effectLst/>
-      </p:bgPr>
-    </p:bg>
     <p:spTree>
       <p:nvGrpSpPr>
         <p:cNvPr id="1" name=""/>
@@ -10397,7 +10132,7 @@
           <p:cNvPr id="2" name="Title 1">
             <a:extLst>
               <a:ext uri="{FF2B5EF4-FFF2-40B4-BE49-F238E27FC236}">
-                <a16:creationId xmlns:a16="http://schemas.microsoft.com/office/drawing/2014/main" id="{AF71F205-E8A9-4237-8AD2-ABD9BF694F3E}"/>
+                <a16:creationId xmlns:a16="http://schemas.microsoft.com/office/drawing/2014/main" id="{E1F4E428-E98C-4185-A0F1-D557D688E60C}"/>
               </a:ext>
             </a:extLst>
           </p:cNvPr>
@@ -10408,12 +10143,7 @@
             <p:ph type="title"/>
           </p:nvPr>
         </p:nvSpPr>
-        <p:spPr>
-          <a:xfrm>
-            <a:off x="913795" y="609600"/>
-            <a:ext cx="10353762" cy="1257300"/>
-          </a:xfrm>
-        </p:spPr>
+        <p:spPr/>
         <p:txBody>
           <a:bodyPr>
             <a:normAutofit/>
@@ -10422,46 +10152,97 @@
           <a:p>
             <a:r>
               <a:rPr lang="en-US" dirty="0"/>
-              <a:t>Trading Model Summary</a:t>
+              <a:t>Data Sources and Python Packages</a:t>
             </a:r>
           </a:p>
         </p:txBody>
       </p:sp>
-      <p:graphicFrame>
-        <p:nvGraphicFramePr>
-          <p:cNvPr id="12" name="Content Placeholder 2" descr="SmartArt graphic">
+      <p:sp>
+        <p:nvSpPr>
+          <p:cNvPr id="3" name="Content Placeholder 2">
             <a:extLst>
               <a:ext uri="{FF2B5EF4-FFF2-40B4-BE49-F238E27FC236}">
-                <a16:creationId xmlns:a16="http://schemas.microsoft.com/office/drawing/2014/main" id="{1E5659A2-FA7D-4C38-864B-37B42C27540F}"/>
+                <a16:creationId xmlns:a16="http://schemas.microsoft.com/office/drawing/2014/main" id="{56E7A42E-888A-44C3-8027-F5874647FF0C}"/>
               </a:ext>
             </a:extLst>
           </p:cNvPr>
-          <p:cNvGraphicFramePr>
-            <a:graphicFrameLocks noGrp="1"/>
-          </p:cNvGraphicFramePr>
+          <p:cNvSpPr>
+            <a:spLocks noGrp="1"/>
+          </p:cNvSpPr>
           <p:nvPr>
             <p:ph idx="1"/>
-            <p:extLst>
-              <p:ext uri="{D42A27DB-BD31-4B8C-83A1-F6EECF244321}">
-                <p14:modId xmlns:p14="http://schemas.microsoft.com/office/powerpoint/2010/main" val="2316055557"/>
-              </p:ext>
-            </p:extLst>
-          </p:nvPr>
-        </p:nvGraphicFramePr>
-        <p:xfrm>
-          <a:off x="914400" y="2076450"/>
-          <a:ext cx="10353675" cy="3714750"/>
-        </p:xfrm>
-        <a:graphic>
-          <a:graphicData uri="http://schemas.openxmlformats.org/drawingml/2006/diagram">
-            <dgm:relIds xmlns:dgm="http://schemas.openxmlformats.org/drawingml/2006/diagram" xmlns:r="http://schemas.openxmlformats.org/officeDocument/2006/relationships" r:dm="rId3" r:lo="rId4" r:qs="rId5" r:cs="rId6"/>
-          </a:graphicData>
-        </a:graphic>
-      </p:graphicFrame>
+          </p:nvPr>
+        </p:nvSpPr>
+        <p:spPr/>
+        <p:txBody>
+          <a:bodyPr>
+            <a:normAutofit/>
+          </a:bodyPr>
+          <a:lstStyle/>
+          <a:p>
+            <a:r>
+              <a:rPr lang="en-US" dirty="0"/>
+              <a:t>Alpaca sourced Daily Close Price Data for: </a:t>
+            </a:r>
+          </a:p>
+          <a:p>
+            <a:pPr lvl="1"/>
+            <a:r>
+              <a:rPr lang="en-US" dirty="0"/>
+              <a:t>S&amp;P500</a:t>
+            </a:r>
+          </a:p>
+          <a:p>
+            <a:r>
+              <a:rPr lang="en-US" dirty="0"/>
+              <a:t>Python Packages:</a:t>
+            </a:r>
+          </a:p>
+          <a:p>
+            <a:pPr lvl="1"/>
+            <a:r>
+              <a:rPr lang="en-US" dirty="0"/>
+              <a:t>Pandas</a:t>
+            </a:r>
+          </a:p>
+          <a:p>
+            <a:pPr lvl="1"/>
+            <a:r>
+              <a:rPr lang="en-US" dirty="0" err="1"/>
+              <a:t>Numpy</a:t>
+            </a:r>
+            <a:endParaRPr lang="en-US" dirty="0"/>
+          </a:p>
+          <a:p>
+            <a:pPr lvl="1"/>
+            <a:r>
+              <a:rPr lang="en-US" dirty="0" err="1"/>
+              <a:t>Joblib</a:t>
+            </a:r>
+            <a:endParaRPr lang="en-US" dirty="0"/>
+          </a:p>
+          <a:p>
+            <a:pPr lvl="1"/>
+            <a:r>
+              <a:rPr lang="en-US" dirty="0"/>
+              <a:t>Tensor Flow</a:t>
+            </a:r>
+          </a:p>
+          <a:p>
+            <a:endParaRPr lang="en-US" dirty="0"/>
+          </a:p>
+          <a:p>
+            <a:endParaRPr lang="en-US" dirty="0"/>
+          </a:p>
+          <a:p>
+            <a:endParaRPr lang="en-US" dirty="0"/>
+          </a:p>
+        </p:txBody>
+      </p:sp>
     </p:spTree>
     <p:extLst>
       <p:ext uri="{BB962C8B-B14F-4D97-AF65-F5344CB8AC3E}">
-        <p14:creationId xmlns:p14="http://schemas.microsoft.com/office/powerpoint/2010/main" val="3265077456"/>
+        <p14:creationId xmlns:p14="http://schemas.microsoft.com/office/powerpoint/2010/main" val="492196747"/>
       </p:ext>
     </p:extLst>
   </p:cSld>
@@ -10507,210 +10288,76 @@
           <a:chExt cx="0" cy="0"/>
         </a:xfrm>
       </p:grpSpPr>
-      <p:sp useBgFill="1">
-        <p:nvSpPr>
-          <p:cNvPr id="12" name="Rectangle 11">
+      <p:sp>
+        <p:nvSpPr>
+          <p:cNvPr id="2" name="Title 1">
             <a:extLst>
               <a:ext uri="{FF2B5EF4-FFF2-40B4-BE49-F238E27FC236}">
-                <a16:creationId xmlns:a16="http://schemas.microsoft.com/office/drawing/2014/main" id="{72CA733A-8D25-4E63-8273-CC14052E0E8A}"/>
-              </a:ext>
-              <a:ext uri="{C183D7F6-B498-43B3-948B-1728B52AA6E4}">
-                <adec:decorative xmlns:adec="http://schemas.microsoft.com/office/drawing/2017/decorative" val="1"/>
+                <a16:creationId xmlns:a16="http://schemas.microsoft.com/office/drawing/2014/main" id="{AF71F205-E8A9-4237-8AD2-ABD9BF694F3E}"/>
               </a:ext>
             </a:extLst>
           </p:cNvPr>
           <p:cNvSpPr>
-            <a:spLocks noGrp="1" noRot="1" noChangeAspect="1" noMove="1" noResize="1" noEditPoints="1" noAdjustHandles="1" noChangeArrowheads="1" noChangeShapeType="1" noTextEdit="1"/>
-          </p:cNvSpPr>
-          <p:nvPr>
-            <p:extLst>
-              <p:ext uri="{386F3935-93C4-4BCD-93E2-E3B085C9AB24}">
-                <p16:designElem xmlns:p16="http://schemas.microsoft.com/office/powerpoint/2015/main" val="1"/>
-              </p:ext>
-            </p:extLst>
+            <a:spLocks noGrp="1"/>
+          </p:cNvSpPr>
+          <p:nvPr>
+            <p:ph type="title"/>
           </p:nvPr>
         </p:nvSpPr>
         <p:spPr>
           <a:xfrm>
-            <a:off x="0" y="0"/>
-            <a:ext cx="12192000" cy="6858000"/>
+            <a:off x="913795" y="609600"/>
+            <a:ext cx="10353762" cy="1257300"/>
           </a:xfrm>
-          <a:prstGeom prst="rect">
-            <a:avLst/>
-          </a:prstGeom>
-          <a:ln>
-            <a:noFill/>
-          </a:ln>
         </p:spPr>
-        <p:style>
-          <a:lnRef idx="2">
-            <a:schemeClr val="accent1">
-              <a:shade val="50000"/>
-            </a:schemeClr>
-          </a:lnRef>
-          <a:fillRef idx="1">
-            <a:schemeClr val="accent1"/>
-          </a:fillRef>
-          <a:effectRef idx="0">
-            <a:schemeClr val="accent1"/>
-          </a:effectRef>
-          <a:fontRef idx="minor">
-            <a:schemeClr val="lt1"/>
-          </a:fontRef>
-        </p:style>
-        <p:txBody>
-          <a:bodyPr rtlCol="0" anchor="ctr"/>
+        <p:txBody>
+          <a:bodyPr>
+            <a:normAutofit/>
+          </a:bodyPr>
           <a:lstStyle/>
           <a:p>
-            <a:pPr algn="ctr"/>
-            <a:endParaRPr lang="en-US"/>
-          </a:p>
-        </p:txBody>
-      </p:sp>
-      <p:sp>
-        <p:nvSpPr>
-          <p:cNvPr id="14" name="Rectangle 13">
+            <a:r>
+              <a:rPr lang="en-US" dirty="0"/>
+              <a:t>Trading Model Summary</a:t>
+            </a:r>
+          </a:p>
+        </p:txBody>
+      </p:sp>
+      <p:graphicFrame>
+        <p:nvGraphicFramePr>
+          <p:cNvPr id="12" name="Content Placeholder 2" descr="SmartArt graphic">
             <a:extLst>
               <a:ext uri="{FF2B5EF4-FFF2-40B4-BE49-F238E27FC236}">
-                <a16:creationId xmlns:a16="http://schemas.microsoft.com/office/drawing/2014/main" id="{6B28264E-43F8-4339-BE92-AA6B94D4021F}"/>
-              </a:ext>
-              <a:ext uri="{C183D7F6-B498-43B3-948B-1728B52AA6E4}">
-                <adec:decorative xmlns:adec="http://schemas.microsoft.com/office/drawing/2017/decorative" val="1"/>
+                <a16:creationId xmlns:a16="http://schemas.microsoft.com/office/drawing/2014/main" id="{1E5659A2-FA7D-4C38-864B-37B42C27540F}"/>
               </a:ext>
             </a:extLst>
           </p:cNvPr>
-          <p:cNvSpPr>
-            <a:spLocks noGrp="1" noRot="1" noChangeAspect="1" noMove="1" noResize="1" noEditPoints="1" noAdjustHandles="1" noChangeArrowheads="1" noChangeShapeType="1" noTextEdit="1"/>
-          </p:cNvSpPr>
-          <p:nvPr>
+          <p:cNvGraphicFramePr>
+            <a:graphicFrameLocks noGrp="1"/>
+          </p:cNvGraphicFramePr>
+          <p:nvPr>
+            <p:ph idx="1"/>
             <p:extLst>
-              <p:ext uri="{386F3935-93C4-4BCD-93E2-E3B085C9AB24}">
-                <p16:designElem xmlns:p16="http://schemas.microsoft.com/office/powerpoint/2015/main" val="1"/>
+              <p:ext uri="{D42A27DB-BD31-4B8C-83A1-F6EECF244321}">
+                <p14:modId xmlns:p14="http://schemas.microsoft.com/office/powerpoint/2010/main" val="1454524713"/>
               </p:ext>
             </p:extLst>
           </p:nvPr>
-        </p:nvSpPr>
-        <p:spPr>
-          <a:xfrm>
-            <a:off x="-2307" y="4220681"/>
-            <a:ext cx="12188952" cy="2637319"/>
-          </a:xfrm>
-          <a:prstGeom prst="rect">
-            <a:avLst/>
-          </a:prstGeom>
-          <a:gradFill>
-            <a:gsLst>
-              <a:gs pos="42000">
-                <a:schemeClr val="bg1">
-                  <a:alpha val="23000"/>
-                </a:schemeClr>
-              </a:gs>
-              <a:gs pos="0">
-                <a:schemeClr val="bg1">
-                  <a:alpha val="0"/>
-                </a:schemeClr>
-              </a:gs>
-              <a:gs pos="100000">
-                <a:schemeClr val="bg1">
-                  <a:alpha val="36000"/>
-                </a:schemeClr>
-              </a:gs>
-            </a:gsLst>
-            <a:lin ang="5400000" scaled="1"/>
-          </a:gradFill>
-          <a:ln>
-            <a:noFill/>
-          </a:ln>
-        </p:spPr>
-        <p:style>
-          <a:lnRef idx="2">
-            <a:schemeClr val="accent1">
-              <a:shade val="50000"/>
-            </a:schemeClr>
-          </a:lnRef>
-          <a:fillRef idx="1">
-            <a:schemeClr val="accent1"/>
-          </a:fillRef>
-          <a:effectRef idx="0">
-            <a:schemeClr val="accent1"/>
-          </a:effectRef>
-          <a:fontRef idx="minor">
-            <a:schemeClr val="lt1"/>
-          </a:fontRef>
-        </p:style>
-        <p:txBody>
-          <a:bodyPr rtlCol="0" anchor="ctr"/>
-          <a:lstStyle/>
-          <a:p>
-            <a:pPr algn="ctr"/>
-            <a:endParaRPr lang="en-US"/>
-          </a:p>
-        </p:txBody>
-      </p:sp>
-      <p:sp>
-        <p:nvSpPr>
-          <p:cNvPr id="2" name="Title 1">
-            <a:extLst>
-              <a:ext uri="{FF2B5EF4-FFF2-40B4-BE49-F238E27FC236}">
-                <a16:creationId xmlns:a16="http://schemas.microsoft.com/office/drawing/2014/main" id="{13BE3A7C-7A84-4983-ABC2-9E270A71EF1E}"/>
-              </a:ext>
-            </a:extLst>
-          </p:cNvPr>
-          <p:cNvSpPr>
-            <a:spLocks noGrp="1"/>
-          </p:cNvSpPr>
-          <p:nvPr>
-            <p:ph type="title"/>
-          </p:nvPr>
-        </p:nvSpPr>
-        <p:spPr>
-          <a:xfrm>
-            <a:off x="1370693" y="4406537"/>
-            <a:ext cx="9440034" cy="1088336"/>
-          </a:xfrm>
-        </p:spPr>
-        <p:txBody>
-          <a:bodyPr vert="horz" lIns="91440" tIns="45720" rIns="91440" bIns="45720" rtlCol="0" anchor="b">
-            <a:normAutofit/>
-          </a:bodyPr>
-          <a:lstStyle/>
-          <a:p>
-            <a:r>
-              <a:rPr lang="en-US" sz="4800" dirty="0"/>
-              <a:t>Historical Precedence</a:t>
-            </a:r>
-          </a:p>
-        </p:txBody>
-      </p:sp>
-      <p:sp>
-        <p:nvSpPr>
-          <p:cNvPr id="4" name="Content Placeholder 3">
-            <a:extLst>
-              <a:ext uri="{FF2B5EF4-FFF2-40B4-BE49-F238E27FC236}">
-                <a16:creationId xmlns:a16="http://schemas.microsoft.com/office/drawing/2014/main" id="{6FE0E065-CE39-445E-8EE3-0BAFE1F6093F}"/>
-              </a:ext>
-            </a:extLst>
-          </p:cNvPr>
-          <p:cNvSpPr>
-            <a:spLocks noGrp="1"/>
-          </p:cNvSpPr>
-          <p:nvPr>
-            <p:ph idx="1"/>
-          </p:nvPr>
-        </p:nvSpPr>
-        <p:spPr/>
-        <p:txBody>
-          <a:bodyPr/>
-          <a:lstStyle/>
-          <a:p>
-            <a:endParaRPr lang="en-US" dirty="0"/>
-          </a:p>
-        </p:txBody>
-      </p:sp>
+        </p:nvGraphicFramePr>
+        <p:xfrm>
+          <a:off x="914400" y="2076450"/>
+          <a:ext cx="10353675" cy="3714750"/>
+        </p:xfrm>
+        <a:graphic>
+          <a:graphicData uri="http://schemas.openxmlformats.org/drawingml/2006/diagram">
+            <dgm:relIds xmlns:dgm="http://schemas.openxmlformats.org/drawingml/2006/diagram" xmlns:r="http://schemas.openxmlformats.org/officeDocument/2006/relationships" r:dm="rId3" r:lo="rId4" r:qs="rId5" r:cs="rId6"/>
+          </a:graphicData>
+        </a:graphic>
+      </p:graphicFrame>
     </p:spTree>
     <p:extLst>
       <p:ext uri="{BB962C8B-B14F-4D97-AF65-F5344CB8AC3E}">
-        <p14:creationId xmlns:p14="http://schemas.microsoft.com/office/powerpoint/2010/main" val="2979521977"/>
+        <p14:creationId xmlns:p14="http://schemas.microsoft.com/office/powerpoint/2010/main" val="3265077456"/>
       </p:ext>
     </p:extLst>
   </p:cSld>
@@ -10760,7 +10407,7 @@
           <a:p>
             <a:r>
               <a:rPr lang="en-US" dirty="0"/>
-              <a:t>Core Questions</a:t>
+              <a:t>Observations</a:t>
             </a:r>
           </a:p>
         </p:txBody>
@@ -10790,21 +10437,30 @@
           <a:p>
             <a:r>
               <a:rPr lang="en-US" dirty="0"/>
-              <a:t>Can we iteratively improve the model accuracy by analyzing additional Time Series data and/or utilizing NLP to include additional features based on fundamental analysis?</a:t>
+              <a:t>We discovered that although the accuracy score was slightly above 50%, the overall performance over the targeted time period matched the SP&amp;500 benchmark in most cases.</a:t>
             </a:r>
           </a:p>
           <a:p>
             <a:r>
               <a:rPr lang="en-US" dirty="0"/>
-              <a:t>TBD</a:t>
+              <a:t>Absent analysis of individual features made it difficult to determine which had the highest impact on returns thus a classification report would need to be produced in order to perform this level of analysis.</a:t>
             </a:r>
+          </a:p>
+          <a:p>
+            <a:r>
+              <a:rPr lang="en-US" dirty="0"/>
+              <a:t>While there was a significant amount of volatility over the targeted time period, the model favored long positions approximately 96% of the time.</a:t>
+            </a:r>
+          </a:p>
+          <a:p>
+            <a:endParaRPr lang="en-US" dirty="0"/>
           </a:p>
         </p:txBody>
       </p:sp>
     </p:spTree>
     <p:extLst>
       <p:ext uri="{BB962C8B-B14F-4D97-AF65-F5344CB8AC3E}">
-        <p14:creationId xmlns:p14="http://schemas.microsoft.com/office/powerpoint/2010/main" val="4202990932"/>
+        <p14:creationId xmlns:p14="http://schemas.microsoft.com/office/powerpoint/2010/main" val="2221805847"/>
       </p:ext>
     </p:extLst>
   </p:cSld>
@@ -10815,167 +10471,6 @@
 </file>
 
 <file path=ppt/slides/slide6.xml><?xml version="1.0" encoding="utf-8"?>
-<p:sld xmlns:a="http://schemas.openxmlformats.org/drawingml/2006/main" xmlns:r="http://schemas.openxmlformats.org/officeDocument/2006/relationships" xmlns:p="http://schemas.openxmlformats.org/presentationml/2006/main">
-  <p:cSld>
-    <p:spTree>
-      <p:nvGrpSpPr>
-        <p:cNvPr id="1" name=""/>
-        <p:cNvGrpSpPr/>
-        <p:nvPr/>
-      </p:nvGrpSpPr>
-      <p:grpSpPr>
-        <a:xfrm>
-          <a:off x="0" y="0"/>
-          <a:ext cx="0" cy="0"/>
-          <a:chOff x="0" y="0"/>
-          <a:chExt cx="0" cy="0"/>
-        </a:xfrm>
-      </p:grpSpPr>
-      <p:sp>
-        <p:nvSpPr>
-          <p:cNvPr id="2" name="Title 1">
-            <a:extLst>
-              <a:ext uri="{FF2B5EF4-FFF2-40B4-BE49-F238E27FC236}">
-                <a16:creationId xmlns:a16="http://schemas.microsoft.com/office/drawing/2014/main" id="{E1F4E428-E98C-4185-A0F1-D557D688E60C}"/>
-              </a:ext>
-            </a:extLst>
-          </p:cNvPr>
-          <p:cNvSpPr>
-            <a:spLocks noGrp="1"/>
-          </p:cNvSpPr>
-          <p:nvPr>
-            <p:ph type="title"/>
-          </p:nvPr>
-        </p:nvSpPr>
-        <p:spPr/>
-        <p:txBody>
-          <a:bodyPr>
-            <a:normAutofit/>
-          </a:bodyPr>
-          <a:lstStyle/>
-          <a:p>
-            <a:r>
-              <a:rPr lang="en-US" dirty="0"/>
-              <a:t>Data Sources and Python Packages</a:t>
-            </a:r>
-          </a:p>
-        </p:txBody>
-      </p:sp>
-      <p:sp>
-        <p:nvSpPr>
-          <p:cNvPr id="3" name="Content Placeholder 2">
-            <a:extLst>
-              <a:ext uri="{FF2B5EF4-FFF2-40B4-BE49-F238E27FC236}">
-                <a16:creationId xmlns:a16="http://schemas.microsoft.com/office/drawing/2014/main" id="{56E7A42E-888A-44C3-8027-F5874647FF0C}"/>
-              </a:ext>
-            </a:extLst>
-          </p:cNvPr>
-          <p:cNvSpPr>
-            <a:spLocks noGrp="1"/>
-          </p:cNvSpPr>
-          <p:nvPr>
-            <p:ph idx="1"/>
-          </p:nvPr>
-        </p:nvSpPr>
-        <p:spPr/>
-        <p:txBody>
-          <a:bodyPr>
-            <a:normAutofit fontScale="85000" lnSpcReduction="20000"/>
-          </a:bodyPr>
-          <a:lstStyle/>
-          <a:p>
-            <a:r>
-              <a:rPr lang="en-US" dirty="0"/>
-              <a:t>Alpaca sourced Daily Close Price Data for: </a:t>
-            </a:r>
-          </a:p>
-          <a:p>
-            <a:pPr lvl="1"/>
-            <a:r>
-              <a:rPr lang="en-US" dirty="0"/>
-              <a:t>S&amp;P500</a:t>
-            </a:r>
-          </a:p>
-          <a:p>
-            <a:pPr lvl="1"/>
-            <a:r>
-              <a:rPr lang="en-US" dirty="0"/>
-              <a:t>FB</a:t>
-            </a:r>
-          </a:p>
-          <a:p>
-            <a:pPr lvl="1"/>
-            <a:endParaRPr lang="en-US" dirty="0"/>
-          </a:p>
-          <a:p>
-            <a:r>
-              <a:rPr lang="en-US" dirty="0"/>
-              <a:t>Python Packages:</a:t>
-            </a:r>
-          </a:p>
-          <a:p>
-            <a:pPr lvl="1"/>
-            <a:r>
-              <a:rPr lang="en-US" dirty="0" err="1"/>
-              <a:t>Pathlib</a:t>
-            </a:r>
-            <a:endParaRPr lang="en-US" dirty="0"/>
-          </a:p>
-          <a:p>
-            <a:pPr lvl="1"/>
-            <a:r>
-              <a:rPr lang="en-US" dirty="0"/>
-              <a:t>Pandas</a:t>
-            </a:r>
-          </a:p>
-          <a:p>
-            <a:pPr lvl="1"/>
-            <a:r>
-              <a:rPr lang="en-US" dirty="0" err="1"/>
-              <a:t>Numpy</a:t>
-            </a:r>
-            <a:endParaRPr lang="en-US" dirty="0"/>
-          </a:p>
-          <a:p>
-            <a:pPr lvl="1"/>
-            <a:r>
-              <a:rPr lang="en-US" dirty="0" err="1"/>
-              <a:t>Joblib</a:t>
-            </a:r>
-            <a:endParaRPr lang="en-US" dirty="0"/>
-          </a:p>
-          <a:p>
-            <a:pPr lvl="1"/>
-            <a:r>
-              <a:rPr lang="en-US" dirty="0"/>
-              <a:t>Tensor Flow</a:t>
-            </a:r>
-          </a:p>
-          <a:p>
-            <a:endParaRPr lang="en-US" dirty="0"/>
-          </a:p>
-          <a:p>
-            <a:endParaRPr lang="en-US" dirty="0"/>
-          </a:p>
-          <a:p>
-            <a:endParaRPr lang="en-US" dirty="0"/>
-          </a:p>
-        </p:txBody>
-      </p:sp>
-    </p:spTree>
-    <p:extLst>
-      <p:ext uri="{BB962C8B-B14F-4D97-AF65-F5344CB8AC3E}">
-        <p14:creationId xmlns:p14="http://schemas.microsoft.com/office/powerpoint/2010/main" val="492196747"/>
-      </p:ext>
-    </p:extLst>
-  </p:cSld>
-  <p:clrMapOvr>
-    <a:masterClrMapping/>
-  </p:clrMapOvr>
-</p:sld>
-</file>
-
-<file path=ppt/slides/slide7.xml><?xml version="1.0" encoding="utf-8"?>
 <p:sld xmlns:a="http://schemas.openxmlformats.org/drawingml/2006/main" xmlns:r="http://schemas.openxmlformats.org/officeDocument/2006/relationships" xmlns:p="http://schemas.openxmlformats.org/presentationml/2006/main">
   <p:cSld>
     <p:bg>
@@ -11089,8 +10584,8 @@
         </p:nvSpPr>
         <p:spPr>
           <a:xfrm>
-            <a:off x="913795" y="965196"/>
-            <a:ext cx="3153952" cy="1329769"/>
+            <a:off x="464234" y="965196"/>
+            <a:ext cx="3840480" cy="1329769"/>
           </a:xfrm>
         </p:spPr>
         <p:txBody>
@@ -11101,8 +10596,8 @@
           <a:p>
             <a:pPr algn="l"/>
             <a:r>
-              <a:rPr lang="en-US" sz="2800"/>
-              <a:t>Data Analysis</a:t>
+              <a:rPr lang="en-US" sz="2800" dirty="0"/>
+              <a:t>Accuracy Data Analysis</a:t>
             </a:r>
           </a:p>
         </p:txBody>
@@ -11125,26 +10620,26 @@
         </p:nvSpPr>
         <p:spPr>
           <a:xfrm>
-            <a:off x="913796" y="2450353"/>
-            <a:ext cx="3153952" cy="3340847"/>
+            <a:off x="717452" y="1986121"/>
+            <a:ext cx="3350296" cy="2220119"/>
           </a:xfrm>
         </p:spPr>
         <p:txBody>
           <a:bodyPr>
-            <a:normAutofit/>
+            <a:normAutofit lnSpcReduction="10000"/>
           </a:bodyPr>
           <a:lstStyle/>
           <a:p>
             <a:r>
               <a:rPr lang="en-US" sz="1800" dirty="0"/>
-              <a:t>TBD</a:t>
+              <a:t>The data reveals that the accuracy of our model improves over the epochs however, accurately scaling the y axis data would demonstrate a consistent accuracy over the epochs</a:t>
             </a:r>
           </a:p>
           <a:p>
-            <a:r>
-              <a:rPr lang="en-US" sz="1800" dirty="0"/>
-              <a:t>TBD</a:t>
-            </a:r>
+            <a:pPr marL="36900" indent="0">
+              <a:buNone/>
+            </a:pPr>
+            <a:endParaRPr lang="en-US" sz="1800" dirty="0"/>
           </a:p>
           <a:p>
             <a:pPr marL="36900" indent="0">
@@ -11294,6 +10789,331 @@
 </p:sld>
 </file>
 
+<file path=ppt/slides/slide7.xml><?xml version="1.0" encoding="utf-8"?>
+<p:sld xmlns:a="http://schemas.openxmlformats.org/drawingml/2006/main" xmlns:r="http://schemas.openxmlformats.org/officeDocument/2006/relationships" xmlns:p="http://schemas.openxmlformats.org/presentationml/2006/main">
+  <p:cSld>
+    <p:bg>
+      <p:bgPr>
+        <a:blipFill rotWithShape="1">
+          <a:blip r:embed="rId2">
+            <a:duotone>
+              <a:schemeClr val="bg1">
+                <a:shade val="80000"/>
+                <a:lumMod val="80000"/>
+              </a:schemeClr>
+              <a:schemeClr val="bg1">
+                <a:tint val="98000"/>
+              </a:schemeClr>
+            </a:duotone>
+          </a:blip>
+          <a:stretch/>
+        </a:blipFill>
+        <a:effectLst/>
+      </p:bgPr>
+    </p:bg>
+    <p:spTree>
+      <p:nvGrpSpPr>
+        <p:cNvPr id="1" name=""/>
+        <p:cNvGrpSpPr/>
+        <p:nvPr/>
+      </p:nvGrpSpPr>
+      <p:grpSpPr>
+        <a:xfrm>
+          <a:off x="0" y="0"/>
+          <a:ext cx="0" cy="0"/>
+          <a:chOff x="0" y="0"/>
+          <a:chExt cx="0" cy="0"/>
+        </a:xfrm>
+      </p:grpSpPr>
+      <p:sp useBgFill="1">
+        <p:nvSpPr>
+          <p:cNvPr id="20" name="Rectangle 19">
+            <a:extLst>
+              <a:ext uri="{FF2B5EF4-FFF2-40B4-BE49-F238E27FC236}">
+                <a16:creationId xmlns:a16="http://schemas.microsoft.com/office/drawing/2014/main" id="{95CB840F-8E41-4CA5-B79B-25CC80AD234A}"/>
+              </a:ext>
+              <a:ext uri="{C183D7F6-B498-43B3-948B-1728B52AA6E4}">
+                <adec:decorative xmlns:adec="http://schemas.microsoft.com/office/drawing/2017/decorative" val="1"/>
+              </a:ext>
+            </a:extLst>
+          </p:cNvPr>
+          <p:cNvSpPr>
+            <a:spLocks noGrp="1" noRot="1" noChangeAspect="1" noMove="1" noResize="1" noEditPoints="1" noAdjustHandles="1" noChangeArrowheads="1" noChangeShapeType="1" noTextEdit="1"/>
+          </p:cNvSpPr>
+          <p:nvPr>
+            <p:extLst>
+              <p:ext uri="{386F3935-93C4-4BCD-93E2-E3B085C9AB24}">
+                <p16:designElem xmlns:p16="http://schemas.microsoft.com/office/powerpoint/2015/main" val="1"/>
+              </p:ext>
+            </p:extLst>
+          </p:nvPr>
+        </p:nvSpPr>
+        <p:spPr>
+          <a:xfrm>
+            <a:off x="0" y="0"/>
+            <a:ext cx="12192000" cy="6858000"/>
+          </a:xfrm>
+          <a:prstGeom prst="rect">
+            <a:avLst/>
+          </a:prstGeom>
+          <a:ln>
+            <a:noFill/>
+          </a:ln>
+        </p:spPr>
+        <p:style>
+          <a:lnRef idx="2">
+            <a:schemeClr val="accent1">
+              <a:shade val="50000"/>
+            </a:schemeClr>
+          </a:lnRef>
+          <a:fillRef idx="1003">
+            <a:schemeClr val="dk2"/>
+          </a:fillRef>
+          <a:effectRef idx="0">
+            <a:schemeClr val="accent1"/>
+          </a:effectRef>
+          <a:fontRef idx="minor">
+            <a:schemeClr val="lt1"/>
+          </a:fontRef>
+        </p:style>
+        <p:txBody>
+          <a:bodyPr rtlCol="0" anchor="ctr"/>
+          <a:lstStyle/>
+          <a:p>
+            <a:pPr algn="ctr"/>
+            <a:endParaRPr lang="en-US"/>
+          </a:p>
+        </p:txBody>
+      </p:sp>
+      <p:sp>
+        <p:nvSpPr>
+          <p:cNvPr id="2" name="Title 1">
+            <a:extLst>
+              <a:ext uri="{FF2B5EF4-FFF2-40B4-BE49-F238E27FC236}">
+                <a16:creationId xmlns:a16="http://schemas.microsoft.com/office/drawing/2014/main" id="{E1F4E428-E98C-4185-A0F1-D557D688E60C}"/>
+              </a:ext>
+            </a:extLst>
+          </p:cNvPr>
+          <p:cNvSpPr>
+            <a:spLocks noGrp="1"/>
+          </p:cNvSpPr>
+          <p:nvPr>
+            <p:ph type="title"/>
+          </p:nvPr>
+        </p:nvSpPr>
+        <p:spPr>
+          <a:xfrm>
+            <a:off x="913795" y="965196"/>
+            <a:ext cx="3153952" cy="1329769"/>
+          </a:xfrm>
+        </p:spPr>
+        <p:txBody>
+          <a:bodyPr>
+            <a:normAutofit/>
+          </a:bodyPr>
+          <a:lstStyle/>
+          <a:p>
+            <a:pPr algn="l"/>
+            <a:r>
+              <a:rPr lang="en-US" sz="2800" dirty="0"/>
+              <a:t>Loss Analysis</a:t>
+            </a:r>
+          </a:p>
+        </p:txBody>
+      </p:sp>
+      <p:sp>
+        <p:nvSpPr>
+          <p:cNvPr id="3" name="Content Placeholder 2">
+            <a:extLst>
+              <a:ext uri="{FF2B5EF4-FFF2-40B4-BE49-F238E27FC236}">
+                <a16:creationId xmlns:a16="http://schemas.microsoft.com/office/drawing/2014/main" id="{56E7A42E-888A-44C3-8027-F5874647FF0C}"/>
+              </a:ext>
+            </a:extLst>
+          </p:cNvPr>
+          <p:cNvSpPr>
+            <a:spLocks noGrp="1"/>
+          </p:cNvSpPr>
+          <p:nvPr>
+            <p:ph idx="1"/>
+          </p:nvPr>
+        </p:nvSpPr>
+        <p:spPr>
+          <a:xfrm>
+            <a:off x="913796" y="2450353"/>
+            <a:ext cx="3153952" cy="3340847"/>
+          </a:xfrm>
+        </p:spPr>
+        <p:txBody>
+          <a:bodyPr>
+            <a:normAutofit/>
+          </a:bodyPr>
+          <a:lstStyle/>
+          <a:p>
+            <a:r>
+              <a:rPr lang="en-US" sz="1800" dirty="0"/>
+              <a:t>The data reveals that losses in the portfolio improves over the epochs however, accurately scaling the y axis data would demonstrate an insignificant change in losses over the epochs.</a:t>
+            </a:r>
+          </a:p>
+          <a:p>
+            <a:pPr marL="36900" indent="0">
+              <a:buNone/>
+            </a:pPr>
+            <a:endParaRPr lang="en-US" sz="1800" dirty="0"/>
+          </a:p>
+          <a:p>
+            <a:pPr marL="36900" indent="0">
+              <a:buNone/>
+            </a:pPr>
+            <a:endParaRPr lang="en-US" sz="1800" dirty="0"/>
+          </a:p>
+          <a:p>
+            <a:pPr marL="36900" indent="0">
+              <a:buNone/>
+            </a:pPr>
+            <a:endParaRPr lang="en-US" sz="1800" dirty="0"/>
+          </a:p>
+        </p:txBody>
+      </p:sp>
+      <p:sp>
+        <p:nvSpPr>
+          <p:cNvPr id="22" name="Rectangle 21">
+            <a:extLst>
+              <a:ext uri="{FF2B5EF4-FFF2-40B4-BE49-F238E27FC236}">
+                <a16:creationId xmlns:a16="http://schemas.microsoft.com/office/drawing/2014/main" id="{BEF75C5D-2BA1-43DF-A7EA-02C7DEC122DF}"/>
+              </a:ext>
+              <a:ext uri="{C183D7F6-B498-43B3-948B-1728B52AA6E4}">
+                <adec:decorative xmlns:adec="http://schemas.microsoft.com/office/drawing/2017/decorative" val="1"/>
+              </a:ext>
+            </a:extLst>
+          </p:cNvPr>
+          <p:cNvSpPr>
+            <a:spLocks noGrp="1" noRot="1" noChangeAspect="1" noMove="1" noResize="1" noEditPoints="1" noAdjustHandles="1" noChangeArrowheads="1" noChangeShapeType="1" noTextEdit="1"/>
+          </p:cNvSpPr>
+          <p:nvPr>
+            <p:extLst>
+              <p:ext uri="{386F3935-93C4-4BCD-93E2-E3B085C9AB24}">
+                <p16:designElem xmlns:p16="http://schemas.microsoft.com/office/powerpoint/2015/main" val="1"/>
+              </p:ext>
+            </p:extLst>
+          </p:nvPr>
+        </p:nvSpPr>
+        <p:spPr>
+          <a:xfrm>
+            <a:off x="4636008" y="965196"/>
+            <a:ext cx="6581364" cy="4781641"/>
+          </a:xfrm>
+          <a:prstGeom prst="rect">
+            <a:avLst/>
+          </a:prstGeom>
+          <a:solidFill>
+            <a:schemeClr val="tx1"/>
+          </a:solidFill>
+          <a:ln w="190500">
+            <a:solidFill>
+              <a:srgbClr val="FFFFFF">
+                <a:alpha val="7000"/>
+              </a:srgbClr>
+            </a:solidFill>
+          </a:ln>
+        </p:spPr>
+        <p:style>
+          <a:lnRef idx="2">
+            <a:schemeClr val="accent1">
+              <a:shade val="50000"/>
+            </a:schemeClr>
+          </a:lnRef>
+          <a:fillRef idx="1">
+            <a:schemeClr val="accent1"/>
+          </a:fillRef>
+          <a:effectRef idx="0">
+            <a:schemeClr val="accent1"/>
+          </a:effectRef>
+          <a:fontRef idx="minor">
+            <a:schemeClr val="lt1"/>
+          </a:fontRef>
+        </p:style>
+        <p:txBody>
+          <a:bodyPr rtlCol="0" anchor="ctr"/>
+          <a:lstStyle/>
+          <a:p>
+            <a:pPr algn="ctr"/>
+            <a:endParaRPr lang="en-US"/>
+          </a:p>
+        </p:txBody>
+      </p:sp>
+      <p:pic>
+        <p:nvPicPr>
+          <p:cNvPr id="10" name="Picture 9">
+            <a:extLst>
+              <a:ext uri="{FF2B5EF4-FFF2-40B4-BE49-F238E27FC236}">
+                <a16:creationId xmlns:a16="http://schemas.microsoft.com/office/drawing/2014/main" id="{4315DB42-7C7C-49CA-8BA1-33F1CFF2A7B2}"/>
+              </a:ext>
+            </a:extLst>
+          </p:cNvPr>
+          <p:cNvPicPr>
+            <a:picLocks noChangeAspect="1"/>
+          </p:cNvPicPr>
+          <p:nvPr/>
+        </p:nvPicPr>
+        <p:blipFill>
+          <a:blip r:embed="rId3"/>
+          <a:stretch>
+            <a:fillRect/>
+          </a:stretch>
+        </p:blipFill>
+        <p:spPr>
+          <a:xfrm>
+            <a:off x="5681435" y="4332849"/>
+            <a:ext cx="4529797" cy="779678"/>
+          </a:xfrm>
+          <a:prstGeom prst="rect">
+            <a:avLst/>
+          </a:prstGeom>
+        </p:spPr>
+      </p:pic>
+      <p:pic>
+        <p:nvPicPr>
+          <p:cNvPr id="5" name="Picture 4">
+            <a:extLst>
+              <a:ext uri="{FF2B5EF4-FFF2-40B4-BE49-F238E27FC236}">
+                <a16:creationId xmlns:a16="http://schemas.microsoft.com/office/drawing/2014/main" id="{846C3765-A785-4246-AE73-899AF1F112BC}"/>
+              </a:ext>
+            </a:extLst>
+          </p:cNvPr>
+          <p:cNvPicPr>
+            <a:picLocks noChangeAspect="1"/>
+          </p:cNvPicPr>
+          <p:nvPr/>
+        </p:nvPicPr>
+        <p:blipFill>
+          <a:blip r:embed="rId4"/>
+          <a:stretch>
+            <a:fillRect/>
+          </a:stretch>
+        </p:blipFill>
+        <p:spPr>
+          <a:xfrm>
+            <a:off x="5472333" y="1336432"/>
+            <a:ext cx="5050302" cy="2817774"/>
+          </a:xfrm>
+          <a:prstGeom prst="rect">
+            <a:avLst/>
+          </a:prstGeom>
+        </p:spPr>
+      </p:pic>
+    </p:spTree>
+    <p:extLst>
+      <p:ext uri="{BB962C8B-B14F-4D97-AF65-F5344CB8AC3E}">
+        <p14:creationId xmlns:p14="http://schemas.microsoft.com/office/powerpoint/2010/main" val="4041093247"/>
+      </p:ext>
+    </p:extLst>
+  </p:cSld>
+  <p:clrMapOvr>
+    <a:masterClrMapping/>
+  </p:clrMapOvr>
+</p:sld>
+</file>
+
 <file path=ppt/slides/slide8.xml><?xml version="1.0" encoding="utf-8"?>
 <p:sld xmlns:a="http://schemas.openxmlformats.org/drawingml/2006/main" xmlns:r="http://schemas.openxmlformats.org/officeDocument/2006/relationships" xmlns:p="http://schemas.openxmlformats.org/presentationml/2006/main">
   <p:cSld>
@@ -11534,10 +11354,10 @@
       </p:grpSpPr>
       <p:sp>
         <p:nvSpPr>
-          <p:cNvPr id="18" name="Rectangle 17">
+          <p:cNvPr id="22" name="Rectangle 17">
             <a:extLst>
               <a:ext uri="{FF2B5EF4-FFF2-40B4-BE49-F238E27FC236}">
-                <a16:creationId xmlns:a16="http://schemas.microsoft.com/office/drawing/2014/main" id="{5C56FD3A-4F39-4752-AC00-DB25CCA4ED73}"/>
+                <a16:creationId xmlns:a16="http://schemas.microsoft.com/office/drawing/2014/main" id="{1149F43D-E43A-49B5-B781-48DF10A581BD}"/>
               </a:ext>
               <a:ext uri="{C183D7F6-B498-43B3-948B-1728B52AA6E4}">
                 <adec:decorative xmlns:adec="http://schemas.microsoft.com/office/drawing/2017/decorative" val="1"/>
@@ -11557,13 +11377,15 @@
         </p:nvSpPr>
         <p:spPr>
           <a:xfrm>
-            <a:off x="483347" y="482600"/>
-            <a:ext cx="11240496" cy="5892800"/>
+            <a:off x="985720" y="968938"/>
+            <a:ext cx="10278846" cy="4932523"/>
           </a:xfrm>
           <a:prstGeom prst="rect">
             <a:avLst/>
           </a:prstGeom>
-          <a:noFill/>
+          <a:solidFill>
+            <a:schemeClr val="tx1"/>
+          </a:solidFill>
           <a:ln w="190500">
             <a:solidFill>
               <a:schemeClr val="tx1">
@@ -11599,77 +11421,14 @@
       </p:sp>
       <p:sp>
         <p:nvSpPr>
-          <p:cNvPr id="20" name="Rectangle 19">
+          <p:cNvPr id="3" name="Content Placeholder 2">
             <a:extLst>
               <a:ext uri="{FF2B5EF4-FFF2-40B4-BE49-F238E27FC236}">
-                <a16:creationId xmlns:a16="http://schemas.microsoft.com/office/drawing/2014/main" id="{772527DF-A25C-46B4-A5D9-BBE2E310ACAF}"/>
-              </a:ext>
-              <a:ext uri="{C183D7F6-B498-43B3-948B-1728B52AA6E4}">
-                <adec:decorative xmlns:adec="http://schemas.microsoft.com/office/drawing/2017/decorative" val="1"/>
+                <a16:creationId xmlns:a16="http://schemas.microsoft.com/office/drawing/2014/main" id="{E2ED60D4-C132-4EF3-BEF9-D263284BA122}"/>
               </a:ext>
             </a:extLst>
           </p:cNvPr>
           <p:cNvSpPr>
-            <a:spLocks noGrp="1" noRot="1" noChangeAspect="1" noMove="1" noResize="1" noEditPoints="1" noAdjustHandles="1" noChangeArrowheads="1" noChangeShapeType="1" noTextEdit="1"/>
-          </p:cNvSpPr>
-          <p:nvPr>
-            <p:extLst>
-              <p:ext uri="{386F3935-93C4-4BCD-93E2-E3B085C9AB24}">
-                <p16:designElem xmlns:p16="http://schemas.microsoft.com/office/powerpoint/2015/main" val="1"/>
-              </p:ext>
-            </p:extLst>
-          </p:nvPr>
-        </p:nvSpPr>
-        <p:spPr>
-          <a:xfrm>
-            <a:off x="483347" y="482600"/>
-            <a:ext cx="11240496" cy="5892800"/>
-          </a:xfrm>
-          <a:prstGeom prst="rect">
-            <a:avLst/>
-          </a:prstGeom>
-          <a:solidFill>
-            <a:srgbClr val="FFFFFF"/>
-          </a:solidFill>
-          <a:ln>
-            <a:noFill/>
-          </a:ln>
-        </p:spPr>
-        <p:style>
-          <a:lnRef idx="2">
-            <a:schemeClr val="accent1">
-              <a:shade val="50000"/>
-            </a:schemeClr>
-          </a:lnRef>
-          <a:fillRef idx="1">
-            <a:schemeClr val="accent1"/>
-          </a:fillRef>
-          <a:effectRef idx="0">
-            <a:schemeClr val="accent1"/>
-          </a:effectRef>
-          <a:fontRef idx="minor">
-            <a:schemeClr val="lt1"/>
-          </a:fontRef>
-        </p:style>
-        <p:txBody>
-          <a:bodyPr rtlCol="0" anchor="ctr"/>
-          <a:lstStyle/>
-          <a:p>
-            <a:pPr algn="ctr"/>
-            <a:endParaRPr lang="en-US"/>
-          </a:p>
-        </p:txBody>
-      </p:sp>
-      <p:sp>
-        <p:nvSpPr>
-          <p:cNvPr id="3" name="Content Placeholder 2">
-            <a:extLst>
-              <a:ext uri="{FF2B5EF4-FFF2-40B4-BE49-F238E27FC236}">
-                <a16:creationId xmlns:a16="http://schemas.microsoft.com/office/drawing/2014/main" id="{7EFF3F6B-9470-4D33-B261-54151FA60F56}"/>
-              </a:ext>
-            </a:extLst>
-          </p:cNvPr>
-          <p:cNvSpPr>
             <a:spLocks noGrp="1"/>
           </p:cNvSpPr>
           <p:nvPr>
@@ -11688,7 +11447,7 @@
     </p:spTree>
     <p:extLst>
       <p:ext uri="{BB962C8B-B14F-4D97-AF65-F5344CB8AC3E}">
-        <p14:creationId xmlns:p14="http://schemas.microsoft.com/office/powerpoint/2010/main" val="2549738006"/>
+        <p14:creationId xmlns:p14="http://schemas.microsoft.com/office/powerpoint/2010/main" val="87073827"/>
       </p:ext>
     </p:extLst>
   </p:cSld>

</xml_diff>